<commit_message>
add active inference picture
</commit_message>
<xml_diff>
--- a/lessons/notebooks/figures/agent-environment-interaction.pptx
+++ b/lessons/notebooks/figures/agent-environment-interaction.pptx
@@ -104,6 +104,11 @@
       </a:defRPr>
     </a:lvl9pPr>
   </p:defaultTextStyle>
+  <p:extLst>
+    <p:ext uri="{EFAFB233-063F-42B5-8137-9DF3F51BA10A}">
+      <p15:sldGuideLst xmlns:p15="http://schemas.microsoft.com/office/powerpoint/2012/main"/>
+    </p:ext>
+  </p:extLst>
 </p:presentation>
 </file>
 
@@ -254,7 +259,7 @@
           <a:p>
             <a:fld id="{8C0909D4-8A02-4A13-A8FF-945CD9142DC7}" type="datetimeFigureOut">
               <a:rPr lang="en-US" smtClean="0"/>
-              <a:t>9/2/2019</a:t>
+              <a:t>9/3/19</a:t>
             </a:fld>
             <a:endParaRPr lang="en-US"/>
           </a:p>
@@ -452,7 +457,7 @@
           <a:p>
             <a:fld id="{8C0909D4-8A02-4A13-A8FF-945CD9142DC7}" type="datetimeFigureOut">
               <a:rPr lang="en-US" smtClean="0"/>
-              <a:t>9/2/2019</a:t>
+              <a:t>9/3/19</a:t>
             </a:fld>
             <a:endParaRPr lang="en-US"/>
           </a:p>
@@ -660,7 +665,7 @@
           <a:p>
             <a:fld id="{8C0909D4-8A02-4A13-A8FF-945CD9142DC7}" type="datetimeFigureOut">
               <a:rPr lang="en-US" smtClean="0"/>
-              <a:t>9/2/2019</a:t>
+              <a:t>9/3/19</a:t>
             </a:fld>
             <a:endParaRPr lang="en-US"/>
           </a:p>
@@ -858,7 +863,7 @@
           <a:p>
             <a:fld id="{8C0909D4-8A02-4A13-A8FF-945CD9142DC7}" type="datetimeFigureOut">
               <a:rPr lang="en-US" smtClean="0"/>
-              <a:t>9/2/2019</a:t>
+              <a:t>9/3/19</a:t>
             </a:fld>
             <a:endParaRPr lang="en-US"/>
           </a:p>
@@ -1133,7 +1138,7 @@
           <a:p>
             <a:fld id="{8C0909D4-8A02-4A13-A8FF-945CD9142DC7}" type="datetimeFigureOut">
               <a:rPr lang="en-US" smtClean="0"/>
-              <a:t>9/2/2019</a:t>
+              <a:t>9/3/19</a:t>
             </a:fld>
             <a:endParaRPr lang="en-US"/>
           </a:p>
@@ -1398,7 +1403,7 @@
           <a:p>
             <a:fld id="{8C0909D4-8A02-4A13-A8FF-945CD9142DC7}" type="datetimeFigureOut">
               <a:rPr lang="en-US" smtClean="0"/>
-              <a:t>9/2/2019</a:t>
+              <a:t>9/3/19</a:t>
             </a:fld>
             <a:endParaRPr lang="en-US"/>
           </a:p>
@@ -1810,7 +1815,7 @@
           <a:p>
             <a:fld id="{8C0909D4-8A02-4A13-A8FF-945CD9142DC7}" type="datetimeFigureOut">
               <a:rPr lang="en-US" smtClean="0"/>
-              <a:t>9/2/2019</a:t>
+              <a:t>9/3/19</a:t>
             </a:fld>
             <a:endParaRPr lang="en-US"/>
           </a:p>
@@ -1951,7 +1956,7 @@
           <a:p>
             <a:fld id="{8C0909D4-8A02-4A13-A8FF-945CD9142DC7}" type="datetimeFigureOut">
               <a:rPr lang="en-US" smtClean="0"/>
-              <a:t>9/2/2019</a:t>
+              <a:t>9/3/19</a:t>
             </a:fld>
             <a:endParaRPr lang="en-US"/>
           </a:p>
@@ -2064,7 +2069,7 @@
           <a:p>
             <a:fld id="{8C0909D4-8A02-4A13-A8FF-945CD9142DC7}" type="datetimeFigureOut">
               <a:rPr lang="en-US" smtClean="0"/>
-              <a:t>9/2/2019</a:t>
+              <a:t>9/3/19</a:t>
             </a:fld>
             <a:endParaRPr lang="en-US"/>
           </a:p>
@@ -2375,7 +2380,7 @@
           <a:p>
             <a:fld id="{8C0909D4-8A02-4A13-A8FF-945CD9142DC7}" type="datetimeFigureOut">
               <a:rPr lang="en-US" smtClean="0"/>
-              <a:t>9/2/2019</a:t>
+              <a:t>9/3/19</a:t>
             </a:fld>
             <a:endParaRPr lang="en-US"/>
           </a:p>
@@ -2663,7 +2668,7 @@
           <a:p>
             <a:fld id="{8C0909D4-8A02-4A13-A8FF-945CD9142DC7}" type="datetimeFigureOut">
               <a:rPr lang="en-US" smtClean="0"/>
-              <a:t>9/2/2019</a:t>
+              <a:t>9/3/19</a:t>
             </a:fld>
             <a:endParaRPr lang="en-US"/>
           </a:p>
@@ -2904,7 +2909,7 @@
           <a:p>
             <a:fld id="{8C0909D4-8A02-4A13-A8FF-945CD9142DC7}" type="datetimeFigureOut">
               <a:rPr lang="en-US" smtClean="0"/>
-              <a:t>9/2/2019</a:t>
+              <a:t>9/3/19</a:t>
             </a:fld>
             <a:endParaRPr lang="en-US"/>
           </a:p>
@@ -3376,8 +3381,8 @@
           </a:p>
         </p:txBody>
       </p:sp>
-      <mc:AlternateContent xmlns:mc="http://schemas.openxmlformats.org/markup-compatibility/2006">
-        <mc:Choice xmlns:a14="http://schemas.microsoft.com/office/drawing/2010/main" Requires="a14">
+      <mc:AlternateContent xmlns:mc="http://schemas.openxmlformats.org/markup-compatibility/2006" xmlns:a14="http://schemas.microsoft.com/office/drawing/2010/main">
+        <mc:Choice Requires="a14">
           <p:sp>
             <p:nvSpPr>
               <p:cNvPr id="4" name="TextBox 3">
@@ -3406,6 +3411,7 @@
               </a:bodyPr>
               <a:lstStyle/>
               <a:p>
+                <a:pPr/>
                 <a14:m>
                   <m:oMathPara xmlns:m="http://schemas.openxmlformats.org/officeDocument/2006/math">
                     <m:oMathParaPr>
@@ -3445,7 +3451,7 @@
             </p:txBody>
           </p:sp>
         </mc:Choice>
-        <mc:Fallback>
+        <mc:Fallback xmlns="">
           <p:sp>
             <p:nvSpPr>
               <p:cNvPr id="4" name="TextBox 3">
@@ -3640,8 +3646,8 @@
           </a:fontRef>
         </p:style>
       </p:cxnSp>
-      <mc:AlternateContent xmlns:mc="http://schemas.openxmlformats.org/markup-compatibility/2006">
-        <mc:Choice xmlns:a14="http://schemas.microsoft.com/office/drawing/2010/main" Requires="a14">
+      <mc:AlternateContent xmlns:mc="http://schemas.openxmlformats.org/markup-compatibility/2006" xmlns:a14="http://schemas.microsoft.com/office/drawing/2010/main">
+        <mc:Choice Requires="a14">
           <p:sp>
             <p:nvSpPr>
               <p:cNvPr id="14" name="TextBox 13">
@@ -3670,6 +3676,7 @@
               </a:bodyPr>
               <a:lstStyle/>
               <a:p>
+                <a:pPr/>
                 <a14:m>
                   <m:oMathPara xmlns:m="http://schemas.openxmlformats.org/officeDocument/2006/math">
                     <m:oMathParaPr>
@@ -3709,7 +3716,7 @@
             </p:txBody>
           </p:sp>
         </mc:Choice>
-        <mc:Fallback>
+        <mc:Fallback xmlns="">
           <p:sp>
             <p:nvSpPr>
               <p:cNvPr id="14" name="TextBox 13">
@@ -3754,8 +3761,8 @@
           </p:sp>
         </mc:Fallback>
       </mc:AlternateContent>
-      <mc:AlternateContent xmlns:mc="http://schemas.openxmlformats.org/markup-compatibility/2006">
-        <mc:Choice xmlns:a14="http://schemas.microsoft.com/office/drawing/2010/main" Requires="a14">
+      <mc:AlternateContent xmlns:mc="http://schemas.openxmlformats.org/markup-compatibility/2006" xmlns:a14="http://schemas.microsoft.com/office/drawing/2010/main">
+        <mc:Choice Requires="a14">
           <p:sp>
             <p:nvSpPr>
               <p:cNvPr id="15" name="TextBox 14">
@@ -3784,6 +3791,7 @@
               </a:bodyPr>
               <a:lstStyle/>
               <a:p>
+                <a:pPr/>
                 <a14:m>
                   <m:oMathPara xmlns:m="http://schemas.openxmlformats.org/officeDocument/2006/math">
                     <m:oMathParaPr>
@@ -3823,7 +3831,7 @@
             </p:txBody>
           </p:sp>
         </mc:Choice>
-        <mc:Fallback>
+        <mc:Fallback xmlns="">
           <p:sp>
             <p:nvSpPr>
               <p:cNvPr id="15" name="TextBox 14">
@@ -3986,8 +3994,8 @@
           </a:p>
         </p:txBody>
       </p:sp>
-      <mc:AlternateContent xmlns:mc="http://schemas.openxmlformats.org/markup-compatibility/2006">
-        <mc:Choice xmlns:a14="http://schemas.microsoft.com/office/drawing/2010/main" Requires="a14">
+      <mc:AlternateContent xmlns:mc="http://schemas.openxmlformats.org/markup-compatibility/2006" xmlns:a14="http://schemas.microsoft.com/office/drawing/2010/main">
+        <mc:Choice Requires="a14">
           <p:sp>
             <p:nvSpPr>
               <p:cNvPr id="17" name="TextBox 16">
@@ -4016,6 +4024,7 @@
               </a:bodyPr>
               <a:lstStyle/>
               <a:p>
+                <a:pPr/>
                 <a14:m>
                   <m:oMathPara xmlns:m="http://schemas.openxmlformats.org/officeDocument/2006/math">
                     <m:oMathParaPr>
@@ -4067,7 +4076,7 @@
             </p:txBody>
           </p:sp>
         </mc:Choice>
-        <mc:Fallback>
+        <mc:Fallback xmlns="">
           <p:sp>
             <p:nvSpPr>
               <p:cNvPr id="17" name="TextBox 16">
@@ -4112,8 +4121,8 @@
           </p:sp>
         </mc:Fallback>
       </mc:AlternateContent>
-      <mc:AlternateContent xmlns:mc="http://schemas.openxmlformats.org/markup-compatibility/2006">
-        <mc:Choice xmlns:a14="http://schemas.microsoft.com/office/drawing/2010/main" Requires="a14">
+      <mc:AlternateContent xmlns:mc="http://schemas.openxmlformats.org/markup-compatibility/2006" xmlns:a14="http://schemas.microsoft.com/office/drawing/2010/main">
+        <mc:Choice Requires="a14">
           <p:sp>
             <p:nvSpPr>
               <p:cNvPr id="25" name="TextBox 24">
@@ -4142,6 +4151,7 @@
               </a:bodyPr>
               <a:lstStyle/>
               <a:p>
+                <a:pPr/>
                 <a14:m>
                   <m:oMathPara xmlns:m="http://schemas.openxmlformats.org/officeDocument/2006/math">
                     <m:oMathParaPr>
@@ -4162,7 +4172,7 @@
             </p:txBody>
           </p:sp>
         </mc:Choice>
-        <mc:Fallback>
+        <mc:Fallback xmlns="">
           <p:sp>
             <p:nvSpPr>
               <p:cNvPr id="25" name="TextBox 24">
@@ -4311,8 +4321,8 @@
           </a:p>
         </p:txBody>
       </p:sp>
-      <mc:AlternateContent xmlns:mc="http://schemas.openxmlformats.org/markup-compatibility/2006">
-        <mc:Choice xmlns:a14="http://schemas.microsoft.com/office/drawing/2010/main" Requires="a14">
+      <mc:AlternateContent xmlns:mc="http://schemas.openxmlformats.org/markup-compatibility/2006" xmlns:a14="http://schemas.microsoft.com/office/drawing/2010/main">
+        <mc:Choice Requires="a14">
           <p:sp>
             <p:nvSpPr>
               <p:cNvPr id="27" name="TextBox 26">
@@ -4341,6 +4351,7 @@
               </a:bodyPr>
               <a:lstStyle/>
               <a:p>
+                <a:pPr/>
                 <a14:m>
                   <m:oMathPara xmlns:m="http://schemas.openxmlformats.org/officeDocument/2006/math">
                     <m:oMathParaPr>
@@ -4391,7 +4402,7 @@
             </p:txBody>
           </p:sp>
         </mc:Choice>
-        <mc:Fallback>
+        <mc:Fallback xmlns="">
           <p:sp>
             <p:nvSpPr>
               <p:cNvPr id="27" name="TextBox 26">
@@ -4436,8 +4447,8 @@
           </p:sp>
         </mc:Fallback>
       </mc:AlternateContent>
-      <mc:AlternateContent xmlns:mc="http://schemas.openxmlformats.org/markup-compatibility/2006">
-        <mc:Choice xmlns:a14="http://schemas.microsoft.com/office/drawing/2010/main" Requires="a14">
+      <mc:AlternateContent xmlns:mc="http://schemas.openxmlformats.org/markup-compatibility/2006" xmlns:a14="http://schemas.microsoft.com/office/drawing/2010/main">
+        <mc:Choice Requires="a14">
           <p:sp>
             <p:nvSpPr>
               <p:cNvPr id="26" name="TextBox 25">
@@ -4471,6 +4482,7 @@
               </a:bodyPr>
               <a:lstStyle/>
               <a:p>
+                <a:pPr/>
                 <a14:m>
                   <m:oMathPara xmlns:m="http://schemas.openxmlformats.org/officeDocument/2006/math">
                     <m:oMathParaPr>
@@ -4509,7 +4521,7 @@
             </p:txBody>
           </p:sp>
         </mc:Choice>
-        <mc:Fallback>
+        <mc:Fallback xmlns="">
           <p:sp>
             <p:nvSpPr>
               <p:cNvPr id="26" name="TextBox 25">
@@ -4611,8 +4623,8 @@
           </a:p>
         </p:txBody>
       </p:sp>
-      <mc:AlternateContent xmlns:mc="http://schemas.openxmlformats.org/markup-compatibility/2006">
-        <mc:Choice xmlns:a14="http://schemas.microsoft.com/office/drawing/2010/main" Requires="a14">
+      <mc:AlternateContent xmlns:mc="http://schemas.openxmlformats.org/markup-compatibility/2006" xmlns:a14="http://schemas.microsoft.com/office/drawing/2010/main">
+        <mc:Choice Requires="a14">
           <p:sp>
             <p:nvSpPr>
               <p:cNvPr id="28" name="TextBox 27">
@@ -4646,6 +4658,7 @@
               </a:bodyPr>
               <a:lstStyle/>
               <a:p>
+                <a:pPr/>
                 <a14:m>
                   <m:oMathPara xmlns:m="http://schemas.openxmlformats.org/officeDocument/2006/math">
                     <m:oMathParaPr>
@@ -4696,7 +4709,7 @@
             </p:txBody>
           </p:sp>
         </mc:Choice>
-        <mc:Fallback>
+        <mc:Fallback xmlns="">
           <p:sp>
             <p:nvSpPr>
               <p:cNvPr id="28" name="TextBox 27">
@@ -4876,8 +4889,8 @@
           </a:fontRef>
         </p:style>
       </p:cxnSp>
-      <mc:AlternateContent xmlns:mc="http://schemas.openxmlformats.org/markup-compatibility/2006">
-        <mc:Choice xmlns:a14="http://schemas.microsoft.com/office/drawing/2010/main" Requires="a14">
+      <mc:AlternateContent xmlns:mc="http://schemas.openxmlformats.org/markup-compatibility/2006" xmlns:a14="http://schemas.microsoft.com/office/drawing/2010/main">
+        <mc:Choice Requires="a14">
           <p:sp>
             <p:nvSpPr>
               <p:cNvPr id="48" name="TextBox 47">
@@ -4906,6 +4919,7 @@
               </a:bodyPr>
               <a:lstStyle/>
               <a:p>
+                <a:pPr/>
                 <a14:m>
                   <m:oMathPara xmlns:m="http://schemas.openxmlformats.org/officeDocument/2006/math">
                     <m:oMathParaPr>
@@ -4926,7 +4940,7 @@
             </p:txBody>
           </p:sp>
         </mc:Choice>
-        <mc:Fallback>
+        <mc:Fallback xmlns="">
           <p:sp>
             <p:nvSpPr>
               <p:cNvPr id="48" name="TextBox 47">
@@ -4971,8 +4985,8 @@
           </p:sp>
         </mc:Fallback>
       </mc:AlternateContent>
-      <mc:AlternateContent xmlns:mc="http://schemas.openxmlformats.org/markup-compatibility/2006">
-        <mc:Choice xmlns:a14="http://schemas.microsoft.com/office/drawing/2010/main" Requires="a14">
+      <mc:AlternateContent xmlns:mc="http://schemas.openxmlformats.org/markup-compatibility/2006" xmlns:a14="http://schemas.microsoft.com/office/drawing/2010/main">
+        <mc:Choice Requires="a14">
           <p:sp>
             <p:nvSpPr>
               <p:cNvPr id="49" name="TextBox 48">
@@ -5001,6 +5015,7 @@
               </a:bodyPr>
               <a:lstStyle/>
               <a:p>
+                <a:pPr/>
                 <a14:m>
                   <m:oMathPara xmlns:m="http://schemas.openxmlformats.org/officeDocument/2006/math">
                     <m:oMathParaPr>
@@ -5021,7 +5036,7 @@
             </p:txBody>
           </p:sp>
         </mc:Choice>
-        <mc:Fallback>
+        <mc:Fallback xmlns="">
           <p:sp>
             <p:nvSpPr>
               <p:cNvPr id="49" name="TextBox 48">
@@ -5344,8 +5359,8 @@
           </a:p>
         </p:txBody>
       </p:sp>
-      <mc:AlternateContent xmlns:mc="http://schemas.openxmlformats.org/markup-compatibility/2006">
-        <mc:Choice xmlns:a14="http://schemas.microsoft.com/office/drawing/2010/main" Requires="a14">
+      <mc:AlternateContent xmlns:mc="http://schemas.openxmlformats.org/markup-compatibility/2006" xmlns:a14="http://schemas.microsoft.com/office/drawing/2010/main">
+        <mc:Choice Requires="a14">
           <p:sp>
             <p:nvSpPr>
               <p:cNvPr id="70" name="TextBox 69">
@@ -5376,6 +5391,7 @@
               </a:bodyPr>
               <a:lstStyle/>
               <a:p>
+                <a:pPr/>
                 <a14:m>
                   <m:oMathPara xmlns:m="http://schemas.openxmlformats.org/officeDocument/2006/math">
                     <m:oMathParaPr>
@@ -5466,7 +5482,7 @@
             </p:txBody>
           </p:sp>
         </mc:Choice>
-        <mc:Fallback>
+        <mc:Fallback xmlns="">
           <p:sp>
             <p:nvSpPr>
               <p:cNvPr id="70" name="TextBox 69">
@@ -5528,7 +5544,7 @@
             <p:spPr>
               <a:xfrm>
                 <a:off x="7346238" y="3387014"/>
-                <a:ext cx="755143" cy="246221"/>
+                <a:ext cx="574196" cy="246221"/>
               </a:xfrm>
               <a:prstGeom prst="rect">
                 <a:avLst/>
@@ -5596,24 +5612,6 @@
                         </a:solidFill>
                         <a:latin typeface="Cambria Math" panose="02040503050406030204" pitchFamily="18" charset="0"/>
                       </a:rPr>
-                      <m:t>|</m:t>
-                    </m:r>
-                    <m:r>
-                      <a:rPr lang="en-US" sz="1600" b="0" i="1" smtClean="0">
-                        <a:solidFill>
-                          <a:srgbClr val="0070C0"/>
-                        </a:solidFill>
-                        <a:latin typeface="Cambria Math" panose="02040503050406030204" pitchFamily="18" charset="0"/>
-                      </a:rPr>
-                      <m:t>𝑥</m:t>
-                    </m:r>
-                    <m:r>
-                      <a:rPr lang="en-US" sz="1600" b="0" i="1" smtClean="0">
-                        <a:solidFill>
-                          <a:srgbClr val="0070C0"/>
-                        </a:solidFill>
-                        <a:latin typeface="Cambria Math" panose="02040503050406030204" pitchFamily="18" charset="0"/>
-                      </a:rPr>
                       <m:t>)</m:t>
                     </m:r>
                   </m:oMath>
@@ -5645,7 +5643,7 @@
             <p:spPr>
               <a:xfrm>
                 <a:off x="7346238" y="3387014"/>
-                <a:ext cx="755143" cy="246221"/>
+                <a:ext cx="574196" cy="246221"/>
               </a:xfrm>
               <a:prstGeom prst="rect">
                 <a:avLst/>
@@ -5653,7 +5651,7 @@
               <a:blipFill>
                 <a:blip r:embed="rId13"/>
                 <a:stretch>
-                  <a:fillRect l="-16129" t="-27500" r="-12097" b="-50000"/>
+                  <a:fillRect l="-19149" t="-25000" r="-12766" b="-45000"/>
                 </a:stretch>
               </a:blipFill>
             </p:spPr>

</xml_diff>